<commit_message>
updated some course material in CSCI-423
</commit_message>
<xml_diff>
--- a/CSCI-111/week-2/week-2-lecture/week-2-lecture.pptx
+++ b/CSCI-111/week-2/week-2-lecture/week-2-lecture.pptx
@@ -272,7 +272,7 @@
       </p15:sldGuideLst>
     </p:ext>
     <p:ext uri="GoogleSlidesCustomDataVersion2">
-      <go:slidesCustomData xmlns:go="http://customooxmlschemas.google.com/" r:id="rId22" roundtripDataSignature="AMtx7mj2IBDQX5QwIofzZh+1SOeQzZYrPg=="/>
+      <go:slidesCustomData xmlns:go="http://customooxmlschemas.google.com/" r:id="rId22" roundtripDataSignature="AMtx7mj5Qe4Vrpru5q2Iwv7fTUMSEIBPpA=="/>
     </p:ext>
   </p:extLst>
 </p:presentation>
@@ -10917,7 +10917,7 @@
                 <a:cs typeface="Courier New"/>
                 <a:sym typeface="Courier New"/>
               </a:rPr>
-              <a:t>Week-2-Lecture-2</a:t>
+              <a:t>Week-2-Lecture</a:t>
             </a:r>
             <a:r>
               <a:rPr lang="en" sz="1800">
@@ -11204,6 +11204,9 @@
             </a:r>
             <a:r>
               <a:rPr lang="en" sz="1800">
+                <a:solidFill>
+                  <a:schemeClr val="dk2"/>
+                </a:solidFill>
                 <a:latin typeface="Courier New"/>
                 <a:ea typeface="Courier New"/>
                 <a:cs typeface="Courier New"/>
@@ -11213,15 +11216,24 @@
             </a:r>
             <a:r>
               <a:rPr lang="en" sz="1800">
-                <a:solidFill>
-                  <a:schemeClr val="lt1"/>
-                </a:solidFill>
                 <a:latin typeface="Courier New"/>
                 <a:ea typeface="Courier New"/>
                 <a:cs typeface="Courier New"/>
                 <a:sym typeface="Courier New"/>
               </a:rPr>
-              <a:t>Talgat Manglayev</a:t>
+              <a:t> </a:t>
+            </a:r>
+            <a:r>
+              <a:rPr lang="en" sz="1800">
+                <a:solidFill>
+                  <a:schemeClr val="lt1"/>
+                </a:solidFill>
+                <a:latin typeface="Courier New"/>
+                <a:ea typeface="Courier New"/>
+                <a:cs typeface="Courier New"/>
+                <a:sym typeface="Courier New"/>
+              </a:rPr>
+              <a:t>Dr. Talgat Manglayev</a:t>
             </a:r>
             <a:r>
               <a:rPr lang="en" sz="1800">
@@ -11322,12 +11334,36 @@
             </a:r>
             <a:r>
               <a:rPr lang="en" sz="1800">
+                <a:solidFill>
+                  <a:schemeClr val="dk2"/>
+                </a:solidFill>
                 <a:latin typeface="Courier New"/>
                 <a:ea typeface="Courier New"/>
                 <a:cs typeface="Courier New"/>
                 <a:sym typeface="Courier New"/>
               </a:rPr>
               <a:t>&gt;</a:t>
+            </a:r>
+            <a:r>
+              <a:rPr lang="en" sz="1800">
+                <a:latin typeface="Courier New"/>
+                <a:ea typeface="Courier New"/>
+                <a:cs typeface="Courier New"/>
+                <a:sym typeface="Courier New"/>
+              </a:rPr>
+              <a:t> </a:t>
+            </a:r>
+            <a:r>
+              <a:rPr lang="en" sz="1800">
+                <a:solidFill>
+                  <a:schemeClr val="lt1"/>
+                </a:solidFill>
+                <a:latin typeface="Courier New"/>
+                <a:ea typeface="Courier New"/>
+                <a:cs typeface="Courier New"/>
+                <a:sym typeface="Courier New"/>
+              </a:rPr>
+              <a:t>Dr. </a:t>
             </a:r>
             <a:r>
               <a:rPr lang="en" sz="1800">
@@ -11436,6 +11472,9 @@
             </a:r>
             <a:r>
               <a:rPr lang="en" sz="1800">
+                <a:solidFill>
+                  <a:schemeClr val="dk2"/>
+                </a:solidFill>
                 <a:latin typeface="Courier New"/>
                 <a:ea typeface="Courier New"/>
                 <a:cs typeface="Courier New"/>
@@ -11445,15 +11484,36 @@
             </a:r>
             <a:r>
               <a:rPr lang="en" sz="1800">
-                <a:solidFill>
-                  <a:schemeClr val="lt1"/>
-                </a:solidFill>
                 <a:latin typeface="Courier New"/>
                 <a:ea typeface="Courier New"/>
                 <a:cs typeface="Courier New"/>
                 <a:sym typeface="Courier New"/>
               </a:rPr>
-              <a:t>Aigerim Yessenbayeva</a:t>
+              <a:t> </a:t>
+            </a:r>
+            <a:r>
+              <a:rPr lang="en" sz="1800">
+                <a:solidFill>
+                  <a:schemeClr val="lt1"/>
+                </a:solidFill>
+                <a:latin typeface="Courier New"/>
+                <a:ea typeface="Courier New"/>
+                <a:cs typeface="Courier New"/>
+                <a:sym typeface="Courier New"/>
+              </a:rPr>
+              <a:t>Dr. </a:t>
+            </a:r>
+            <a:r>
+              <a:rPr lang="en" sz="1800">
+                <a:solidFill>
+                  <a:schemeClr val="lt1"/>
+                </a:solidFill>
+                <a:latin typeface="Courier New"/>
+                <a:ea typeface="Courier New"/>
+                <a:cs typeface="Courier New"/>
+                <a:sym typeface="Courier New"/>
+              </a:rPr>
+              <a:t>Syed Muhammad Umair Arif</a:t>
             </a:r>
             <a:r>
               <a:rPr lang="en" sz="1800">
@@ -12555,37 +12615,36 @@
           </a:bodyPr>
           <a:lstStyle/>
           <a:p>
-            <a:pPr indent="0" lvl="0" marL="0" rtl="0" algn="ctr">
-              <a:spcBef>
-                <a:spcPts val="0"/>
-              </a:spcBef>
-              <a:spcAft>
-                <a:spcPts val="0"/>
-              </a:spcAft>
-              <a:buNone/>
-            </a:pPr>
-            <a:r>
-              <a:rPr lang="en">
+            <a:pPr indent="0" lvl="0" marL="0" marR="0" rtl="0" algn="ctr">
+              <a:lnSpc>
+                <a:spcPct val="100000"/>
+              </a:lnSpc>
+              <a:spcBef>
+                <a:spcPts val="0"/>
+              </a:spcBef>
+              <a:spcAft>
+                <a:spcPts val="0"/>
+              </a:spcAft>
+              <a:buClr>
+                <a:srgbClr val="000000"/>
+              </a:buClr>
+              <a:buSzPts val="1400"/>
+              <a:buFont typeface="Arial"/>
+              <a:buNone/>
+            </a:pPr>
+            <a:r>
+              <a:rPr b="0" i="0" lang="en" sz="1400" u="none" cap="none" strike="noStrike">
+                <a:solidFill>
+                  <a:srgbClr val="000000"/>
+                </a:solidFill>
                 <a:latin typeface="Courier New"/>
                 <a:ea typeface="Courier New"/>
                 <a:cs typeface="Courier New"/>
                 <a:sym typeface="Courier New"/>
               </a:rPr>
-              <a:t>page-2</a:t>
-            </a:r>
-            <a:r>
-              <a:rPr lang="en">
-                <a:solidFill>
-                  <a:srgbClr val="000000"/>
-                </a:solidFill>
-                <a:latin typeface="Courier New"/>
-                <a:ea typeface="Courier New"/>
-                <a:cs typeface="Courier New"/>
-                <a:sym typeface="Courier New"/>
-              </a:rPr>
-              <a:t>.html</a:t>
-            </a:r>
-            <a:endParaRPr>
+              <a:t>page-2.html</a:t>
+            </a:r>
+            <a:endParaRPr b="0" i="0" sz="1400" u="none" cap="none" strike="noStrike">
               <a:solidFill>
                 <a:srgbClr val="000000"/>
               </a:solidFill>
@@ -13281,37 +13340,36 @@
           </a:bodyPr>
           <a:lstStyle/>
           <a:p>
-            <a:pPr indent="0" lvl="0" marL="0" rtl="0" algn="ctr">
-              <a:spcBef>
-                <a:spcPts val="0"/>
-              </a:spcBef>
-              <a:spcAft>
-                <a:spcPts val="0"/>
-              </a:spcAft>
-              <a:buNone/>
-            </a:pPr>
-            <a:r>
-              <a:rPr lang="en">
+            <a:pPr indent="0" lvl="0" marL="0" marR="0" rtl="0" algn="ctr">
+              <a:lnSpc>
+                <a:spcPct val="100000"/>
+              </a:lnSpc>
+              <a:spcBef>
+                <a:spcPts val="0"/>
+              </a:spcBef>
+              <a:spcAft>
+                <a:spcPts val="0"/>
+              </a:spcAft>
+              <a:buClr>
+                <a:srgbClr val="000000"/>
+              </a:buClr>
+              <a:buSzPts val="1400"/>
+              <a:buFont typeface="Arial"/>
+              <a:buNone/>
+            </a:pPr>
+            <a:r>
+              <a:rPr b="0" i="0" lang="en" sz="1400" u="none" cap="none" strike="noStrike">
+                <a:solidFill>
+                  <a:srgbClr val="000000"/>
+                </a:solidFill>
                 <a:latin typeface="Courier New"/>
                 <a:ea typeface="Courier New"/>
                 <a:cs typeface="Courier New"/>
                 <a:sym typeface="Courier New"/>
               </a:rPr>
-              <a:t>page-3</a:t>
-            </a:r>
-            <a:r>
-              <a:rPr lang="en">
-                <a:solidFill>
-                  <a:srgbClr val="000000"/>
-                </a:solidFill>
-                <a:latin typeface="Courier New"/>
-                <a:ea typeface="Courier New"/>
-                <a:cs typeface="Courier New"/>
-                <a:sym typeface="Courier New"/>
-              </a:rPr>
-              <a:t>.html</a:t>
-            </a:r>
-            <a:endParaRPr>
+              <a:t>page-3.html</a:t>
+            </a:r>
+            <a:endParaRPr b="0" i="0" sz="1400" u="none" cap="none" strike="noStrike">
               <a:solidFill>
                 <a:srgbClr val="000000"/>
               </a:solidFill>
@@ -14175,37 +14233,36 @@
           </a:bodyPr>
           <a:lstStyle/>
           <a:p>
-            <a:pPr indent="0" lvl="0" marL="0" rtl="0" algn="ctr">
-              <a:spcBef>
-                <a:spcPts val="0"/>
-              </a:spcBef>
-              <a:spcAft>
-                <a:spcPts val="0"/>
-              </a:spcAft>
-              <a:buNone/>
-            </a:pPr>
-            <a:r>
-              <a:rPr lang="en">
+            <a:pPr indent="0" lvl="0" marL="0" marR="0" rtl="0" algn="ctr">
+              <a:lnSpc>
+                <a:spcPct val="100000"/>
+              </a:lnSpc>
+              <a:spcBef>
+                <a:spcPts val="0"/>
+              </a:spcBef>
+              <a:spcAft>
+                <a:spcPts val="0"/>
+              </a:spcAft>
+              <a:buClr>
+                <a:srgbClr val="000000"/>
+              </a:buClr>
+              <a:buSzPts val="1400"/>
+              <a:buFont typeface="Arial"/>
+              <a:buNone/>
+            </a:pPr>
+            <a:r>
+              <a:rPr b="0" i="0" lang="en" sz="1400" u="none" cap="none" strike="noStrike">
+                <a:solidFill>
+                  <a:srgbClr val="000000"/>
+                </a:solidFill>
                 <a:latin typeface="Courier New"/>
                 <a:ea typeface="Courier New"/>
                 <a:cs typeface="Courier New"/>
                 <a:sym typeface="Courier New"/>
               </a:rPr>
-              <a:t>page-4</a:t>
-            </a:r>
-            <a:r>
-              <a:rPr lang="en">
-                <a:solidFill>
-                  <a:srgbClr val="000000"/>
-                </a:solidFill>
-                <a:latin typeface="Courier New"/>
-                <a:ea typeface="Courier New"/>
-                <a:cs typeface="Courier New"/>
-                <a:sym typeface="Courier New"/>
-              </a:rPr>
-              <a:t>.html</a:t>
-            </a:r>
-            <a:endParaRPr>
+              <a:t>page-4.html</a:t>
+            </a:r>
+            <a:endParaRPr b="0" i="0" sz="1400" u="none" cap="none" strike="noStrike">
               <a:solidFill>
                 <a:srgbClr val="000000"/>
               </a:solidFill>
@@ -14810,37 +14867,36 @@
           </a:bodyPr>
           <a:lstStyle/>
           <a:p>
-            <a:pPr indent="0" lvl="0" marL="0" rtl="0" algn="ctr">
-              <a:spcBef>
-                <a:spcPts val="0"/>
-              </a:spcBef>
-              <a:spcAft>
-                <a:spcPts val="0"/>
-              </a:spcAft>
-              <a:buNone/>
-            </a:pPr>
-            <a:r>
-              <a:rPr lang="en">
+            <a:pPr indent="0" lvl="0" marL="0" marR="0" rtl="0" algn="ctr">
+              <a:lnSpc>
+                <a:spcPct val="100000"/>
+              </a:lnSpc>
+              <a:spcBef>
+                <a:spcPts val="0"/>
+              </a:spcBef>
+              <a:spcAft>
+                <a:spcPts val="0"/>
+              </a:spcAft>
+              <a:buClr>
+                <a:srgbClr val="000000"/>
+              </a:buClr>
+              <a:buSzPts val="1400"/>
+              <a:buFont typeface="Arial"/>
+              <a:buNone/>
+            </a:pPr>
+            <a:r>
+              <a:rPr b="0" i="0" lang="en" sz="1400" u="none" cap="none" strike="noStrike">
+                <a:solidFill>
+                  <a:srgbClr val="000000"/>
+                </a:solidFill>
                 <a:latin typeface="Courier New"/>
                 <a:ea typeface="Courier New"/>
                 <a:cs typeface="Courier New"/>
                 <a:sym typeface="Courier New"/>
               </a:rPr>
-              <a:t>page-5</a:t>
-            </a:r>
-            <a:r>
-              <a:rPr lang="en">
-                <a:solidFill>
-                  <a:srgbClr val="000000"/>
-                </a:solidFill>
-                <a:latin typeface="Courier New"/>
-                <a:ea typeface="Courier New"/>
-                <a:cs typeface="Courier New"/>
-                <a:sym typeface="Courier New"/>
-              </a:rPr>
-              <a:t>.html</a:t>
-            </a:r>
-            <a:endParaRPr>
+              <a:t>page-5.html</a:t>
+            </a:r>
+            <a:endParaRPr b="0" i="0" sz="1400" u="none" cap="none" strike="noStrike">
               <a:solidFill>
                 <a:srgbClr val="000000"/>
               </a:solidFill>
@@ -18382,37 +18438,36 @@
           </a:bodyPr>
           <a:lstStyle/>
           <a:p>
-            <a:pPr indent="0" lvl="0" marL="0" rtl="0" algn="ctr">
-              <a:spcBef>
-                <a:spcPts val="0"/>
-              </a:spcBef>
-              <a:spcAft>
-                <a:spcPts val="0"/>
-              </a:spcAft>
-              <a:buNone/>
-            </a:pPr>
-            <a:r>
-              <a:rPr lang="en">
+            <a:pPr indent="0" lvl="0" marL="0" marR="0" rtl="0" algn="ctr">
+              <a:lnSpc>
+                <a:spcPct val="100000"/>
+              </a:lnSpc>
+              <a:spcBef>
+                <a:spcPts val="0"/>
+              </a:spcBef>
+              <a:spcAft>
+                <a:spcPts val="0"/>
+              </a:spcAft>
+              <a:buClr>
+                <a:srgbClr val="000000"/>
+              </a:buClr>
+              <a:buSzPts val="1400"/>
+              <a:buFont typeface="Arial"/>
+              <a:buNone/>
+            </a:pPr>
+            <a:r>
+              <a:rPr b="0" i="0" lang="en" sz="1400" u="none" cap="none" strike="noStrike">
+                <a:solidFill>
+                  <a:srgbClr val="000000"/>
+                </a:solidFill>
                 <a:latin typeface="Courier New"/>
                 <a:ea typeface="Courier New"/>
                 <a:cs typeface="Courier New"/>
                 <a:sym typeface="Courier New"/>
               </a:rPr>
-              <a:t>page-1</a:t>
-            </a:r>
-            <a:r>
-              <a:rPr lang="en">
-                <a:solidFill>
-                  <a:srgbClr val="000000"/>
-                </a:solidFill>
-                <a:latin typeface="Courier New"/>
-                <a:ea typeface="Courier New"/>
-                <a:cs typeface="Courier New"/>
-                <a:sym typeface="Courier New"/>
-              </a:rPr>
-              <a:t>.html</a:t>
-            </a:r>
-            <a:endParaRPr>
+              <a:t>page-1.html</a:t>
+            </a:r>
+            <a:endParaRPr b="0" i="0" sz="1400" u="none" cap="none" strike="noStrike">
               <a:solidFill>
                 <a:srgbClr val="000000"/>
               </a:solidFill>
@@ -19415,37 +19470,36 @@
           </a:bodyPr>
           <a:lstStyle/>
           <a:p>
-            <a:pPr indent="0" lvl="0" marL="0" rtl="0" algn="ctr">
-              <a:spcBef>
-                <a:spcPts val="0"/>
-              </a:spcBef>
-              <a:spcAft>
-                <a:spcPts val="0"/>
-              </a:spcAft>
-              <a:buNone/>
-            </a:pPr>
-            <a:r>
-              <a:rPr lang="en">
+            <a:pPr indent="0" lvl="0" marL="0" marR="0" rtl="0" algn="ctr">
+              <a:lnSpc>
+                <a:spcPct val="100000"/>
+              </a:lnSpc>
+              <a:spcBef>
+                <a:spcPts val="0"/>
+              </a:spcBef>
+              <a:spcAft>
+                <a:spcPts val="0"/>
+              </a:spcAft>
+              <a:buClr>
+                <a:srgbClr val="000000"/>
+              </a:buClr>
+              <a:buSzPts val="1400"/>
+              <a:buFont typeface="Arial"/>
+              <a:buNone/>
+            </a:pPr>
+            <a:r>
+              <a:rPr b="0" i="0" lang="en" sz="1400" u="none" cap="none" strike="noStrike">
+                <a:solidFill>
+                  <a:srgbClr val="000000"/>
+                </a:solidFill>
                 <a:latin typeface="Courier New"/>
                 <a:ea typeface="Courier New"/>
                 <a:cs typeface="Courier New"/>
                 <a:sym typeface="Courier New"/>
               </a:rPr>
-              <a:t>page-1</a:t>
-            </a:r>
-            <a:r>
-              <a:rPr lang="en">
-                <a:solidFill>
-                  <a:srgbClr val="000000"/>
-                </a:solidFill>
-                <a:latin typeface="Courier New"/>
-                <a:ea typeface="Courier New"/>
-                <a:cs typeface="Courier New"/>
-                <a:sym typeface="Courier New"/>
-              </a:rPr>
-              <a:t>.html</a:t>
-            </a:r>
-            <a:endParaRPr>
+              <a:t>page-1.html</a:t>
+            </a:r>
+            <a:endParaRPr b="0" i="0" sz="1400" u="none" cap="none" strike="noStrike">
               <a:solidFill>
                 <a:srgbClr val="000000"/>
               </a:solidFill>

</xml_diff>